<commit_message>
Fix next question part coming on same slide.
</commit_message>
<xml_diff>
--- a/ppts/0625_s04_qp_1_mcq.pptx
+++ b/ppts/0625_s04_qp_1_mcq.pptx
@@ -3236,7 +3236,7 @@
         <p:spPr>
           <a:xfrm>
             <a:off x="365760" y="731520"/>
-            <a:ext cx="8229600" cy="3330747"/>
+            <a:ext cx="8229600" cy="2694311"/>
           </a:xfrm>
           <a:prstGeom prst="rect">
             <a:avLst/>
@@ -3313,7 +3313,7 @@
         <p:spPr>
           <a:xfrm>
             <a:off x="365760" y="731520"/>
-            <a:ext cx="5343302" cy="5943600"/>
+            <a:ext cx="6201084" cy="5943600"/>
           </a:xfrm>
           <a:prstGeom prst="rect">
             <a:avLst/>
@@ -3390,7 +3390,7 @@
         <p:spPr>
           <a:xfrm>
             <a:off x="365760" y="731520"/>
-            <a:ext cx="6668429" cy="5943600"/>
+            <a:ext cx="7918304" cy="5943600"/>
           </a:xfrm>
           <a:prstGeom prst="rect">
             <a:avLst/>
@@ -3467,7 +3467,7 @@
         <p:spPr>
           <a:xfrm>
             <a:off x="365760" y="731520"/>
-            <a:ext cx="8229600" cy="5623174"/>
+            <a:ext cx="8229600" cy="4905167"/>
           </a:xfrm>
           <a:prstGeom prst="rect">
             <a:avLst/>
@@ -3544,7 +3544,7 @@
         <p:spPr>
           <a:xfrm>
             <a:off x="365760" y="731520"/>
-            <a:ext cx="8042414" cy="5943600"/>
+            <a:ext cx="8229600" cy="5040004"/>
           </a:xfrm>
           <a:prstGeom prst="rect">
             <a:avLst/>
@@ -3621,7 +3621,7 @@
         <p:spPr>
           <a:xfrm>
             <a:off x="365760" y="731520"/>
-            <a:ext cx="8229600" cy="4704981"/>
+            <a:ext cx="8229600" cy="4280478"/>
           </a:xfrm>
           <a:prstGeom prst="rect">
             <a:avLst/>
@@ -3698,7 +3698,7 @@
         <p:spPr>
           <a:xfrm>
             <a:off x="365760" y="731520"/>
-            <a:ext cx="8229600" cy="2717579"/>
+            <a:ext cx="8229600" cy="2314065"/>
           </a:xfrm>
           <a:prstGeom prst="rect">
             <a:avLst/>
@@ -3775,7 +3775,7 @@
         <p:spPr>
           <a:xfrm>
             <a:off x="365760" y="731520"/>
-            <a:ext cx="8229600" cy="5496032"/>
+            <a:ext cx="8229600" cy="4791093"/>
           </a:xfrm>
           <a:prstGeom prst="rect">
             <a:avLst/>
@@ -3852,7 +3852,7 @@
         <p:spPr>
           <a:xfrm>
             <a:off x="365760" y="731520"/>
-            <a:ext cx="8229600" cy="3917025"/>
+            <a:ext cx="8229600" cy="3498259"/>
           </a:xfrm>
           <a:prstGeom prst="rect">
             <a:avLst/>
@@ -3929,7 +3929,7 @@
         <p:spPr>
           <a:xfrm>
             <a:off x="365760" y="731520"/>
-            <a:ext cx="8229600" cy="4241155"/>
+            <a:ext cx="8229600" cy="3813319"/>
           </a:xfrm>
           <a:prstGeom prst="rect">
             <a:avLst/>
@@ -4006,7 +4006,7 @@
         <p:spPr>
           <a:xfrm>
             <a:off x="365760" y="731520"/>
-            <a:ext cx="7832815" cy="5943600"/>
+            <a:ext cx="8229600" cy="5188079"/>
           </a:xfrm>
           <a:prstGeom prst="rect">
             <a:avLst/>
@@ -4083,7 +4083,7 @@
         <p:spPr>
           <a:xfrm>
             <a:off x="365760" y="731520"/>
-            <a:ext cx="8229600" cy="5587118"/>
+            <a:ext cx="8229600" cy="5149611"/>
           </a:xfrm>
           <a:prstGeom prst="rect">
             <a:avLst/>
@@ -4160,7 +4160,7 @@
         <p:spPr>
           <a:xfrm>
             <a:off x="365760" y="731520"/>
-            <a:ext cx="7867610" cy="5943600"/>
+            <a:ext cx="8229600" cy="5163558"/>
           </a:xfrm>
           <a:prstGeom prst="rect">
             <a:avLst/>
@@ -4237,7 +4237,7 @@
         <p:spPr>
           <a:xfrm>
             <a:off x="365760" y="731520"/>
-            <a:ext cx="8229600" cy="4807009"/>
+            <a:ext cx="8229600" cy="4372823"/>
           </a:xfrm>
           <a:prstGeom prst="rect">
             <a:avLst/>
@@ -4314,7 +4314,7 @@
         <p:spPr>
           <a:xfrm>
             <a:off x="365760" y="731520"/>
-            <a:ext cx="8229600" cy="3588261"/>
+            <a:ext cx="8229600" cy="2766848"/>
           </a:xfrm>
           <a:prstGeom prst="rect">
             <a:avLst/>
@@ -4391,7 +4391,7 @@
         <p:spPr>
           <a:xfrm>
             <a:off x="365760" y="731520"/>
-            <a:ext cx="6312628" cy="5943600"/>
+            <a:ext cx="7475887" cy="5943600"/>
           </a:xfrm>
           <a:prstGeom prst="rect">
             <a:avLst/>
@@ -4468,7 +4468,7 @@
         <p:spPr>
           <a:xfrm>
             <a:off x="365760" y="731520"/>
-            <a:ext cx="6412544" cy="5943600"/>
+            <a:ext cx="7604311" cy="5943600"/>
           </a:xfrm>
           <a:prstGeom prst="rect">
             <a:avLst/>
@@ -4545,7 +4545,7 @@
         <p:spPr>
           <a:xfrm>
             <a:off x="365760" y="731520"/>
-            <a:ext cx="8229600" cy="3546457"/>
+            <a:ext cx="8229600" cy="2684477"/>
           </a:xfrm>
           <a:prstGeom prst="rect">
             <a:avLst/>
@@ -4622,7 +4622,7 @@
         <p:spPr>
           <a:xfrm>
             <a:off x="365760" y="731520"/>
-            <a:ext cx="8229600" cy="5938716"/>
+            <a:ext cx="8229600" cy="5497264"/>
           </a:xfrm>
           <a:prstGeom prst="rect">
             <a:avLst/>
@@ -4699,7 +4699,7 @@
         <p:spPr>
           <a:xfrm>
             <a:off x="365760" y="731520"/>
-            <a:ext cx="8229600" cy="3350254"/>
+            <a:ext cx="8229600" cy="2522482"/>
           </a:xfrm>
           <a:prstGeom prst="rect">
             <a:avLst/>
@@ -4776,7 +4776,7 @@
         <p:spPr>
           <a:xfrm>
             <a:off x="365760" y="731520"/>
-            <a:ext cx="8229600" cy="2943713"/>
+            <a:ext cx="8229600" cy="2231949"/>
           </a:xfrm>
           <a:prstGeom prst="rect">
             <a:avLst/>
@@ -4853,7 +4853,7 @@
         <p:spPr>
           <a:xfrm>
             <a:off x="365760" y="731520"/>
-            <a:ext cx="8229600" cy="4373857"/>
+            <a:ext cx="8229600" cy="3563443"/>
           </a:xfrm>
           <a:prstGeom prst="rect">
             <a:avLst/>
@@ -4930,7 +4930,7 @@
         <p:spPr>
           <a:xfrm>
             <a:off x="365760" y="731520"/>
-            <a:ext cx="8229600" cy="2609519"/>
+            <a:ext cx="8229600" cy="2205424"/>
           </a:xfrm>
           <a:prstGeom prst="rect">
             <a:avLst/>
@@ -5007,7 +5007,7 @@
         <p:spPr>
           <a:xfrm>
             <a:off x="365760" y="731520"/>
-            <a:ext cx="8229600" cy="3323631"/>
+            <a:ext cx="8229600" cy="2545237"/>
           </a:xfrm>
           <a:prstGeom prst="rect">
             <a:avLst/>
@@ -5084,7 +5084,7 @@
         <p:spPr>
           <a:xfrm>
             <a:off x="365760" y="731520"/>
-            <a:ext cx="8229600" cy="3653327"/>
+            <a:ext cx="8229600" cy="3232087"/>
           </a:xfrm>
           <a:prstGeom prst="rect">
             <a:avLst/>
@@ -5161,7 +5161,7 @@
         <p:spPr>
           <a:xfrm>
             <a:off x="365760" y="731520"/>
-            <a:ext cx="5992318" cy="5943600"/>
+            <a:ext cx="7052284" cy="5943600"/>
           </a:xfrm>
           <a:prstGeom prst="rect">
             <a:avLst/>
@@ -5238,7 +5238,7 @@
         <p:spPr>
           <a:xfrm>
             <a:off x="365760" y="731520"/>
-            <a:ext cx="8229600" cy="3916761"/>
+            <a:ext cx="8229600" cy="3106463"/>
           </a:xfrm>
           <a:prstGeom prst="rect">
             <a:avLst/>
@@ -5315,7 +5315,7 @@
         <p:spPr>
           <a:xfrm>
             <a:off x="365760" y="731520"/>
-            <a:ext cx="8229600" cy="2699364"/>
+            <a:ext cx="8229600" cy="1993544"/>
           </a:xfrm>
           <a:prstGeom prst="rect">
             <a:avLst/>
@@ -5392,7 +5392,7 @@
         <p:spPr>
           <a:xfrm>
             <a:off x="365760" y="731520"/>
-            <a:ext cx="8229600" cy="5704009"/>
+            <a:ext cx="8229600" cy="4706006"/>
           </a:xfrm>
           <a:prstGeom prst="rect">
             <a:avLst/>
@@ -5469,7 +5469,7 @@
         <p:spPr>
           <a:xfrm>
             <a:off x="365760" y="731520"/>
-            <a:ext cx="8229600" cy="5482737"/>
+            <a:ext cx="8229600" cy="5040969"/>
           </a:xfrm>
           <a:prstGeom prst="rect">
             <a:avLst/>
@@ -5546,7 +5546,7 @@
         <p:spPr>
           <a:xfrm>
             <a:off x="365760" y="731520"/>
-            <a:ext cx="8229600" cy="4780291"/>
+            <a:ext cx="8229600" cy="3880306"/>
           </a:xfrm>
           <a:prstGeom prst="rect">
             <a:avLst/>
@@ -5623,7 +5623,7 @@
         <p:spPr>
           <a:xfrm>
             <a:off x="365760" y="731520"/>
-            <a:ext cx="8229600" cy="5451185"/>
+            <a:ext cx="8229600" cy="4422170"/>
           </a:xfrm>
           <a:prstGeom prst="rect">
             <a:avLst/>
@@ -5700,7 +5700,7 @@
         <p:spPr>
           <a:xfrm>
             <a:off x="365760" y="731520"/>
-            <a:ext cx="8229600" cy="4982590"/>
+            <a:ext cx="8229600" cy="4063221"/>
           </a:xfrm>
           <a:prstGeom prst="rect">
             <a:avLst/>
@@ -5777,7 +5777,7 @@
         <p:spPr>
           <a:xfrm>
             <a:off x="365760" y="731520"/>
-            <a:ext cx="8229600" cy="2719393"/>
+            <a:ext cx="8229600" cy="2314065"/>
           </a:xfrm>
           <a:prstGeom prst="rect">
             <a:avLst/>
@@ -5854,7 +5854,7 @@
         <p:spPr>
           <a:xfrm>
             <a:off x="365760" y="731520"/>
-            <a:ext cx="8229600" cy="1663908"/>
+            <a:ext cx="8229600" cy="1038885"/>
           </a:xfrm>
           <a:prstGeom prst="rect">
             <a:avLst/>
@@ -5931,7 +5931,7 @@
         <p:spPr>
           <a:xfrm>
             <a:off x="365760" y="731520"/>
-            <a:ext cx="8229600" cy="3737034"/>
+            <a:ext cx="8229600" cy="2891481"/>
           </a:xfrm>
           <a:prstGeom prst="rect">
             <a:avLst/>
@@ -6008,7 +6008,7 @@
         <p:spPr>
           <a:xfrm>
             <a:off x="365760" y="731520"/>
-            <a:ext cx="8229600" cy="3174623"/>
+            <a:ext cx="8229600" cy="2378926"/>
           </a:xfrm>
           <a:prstGeom prst="rect">
             <a:avLst/>
@@ -6085,7 +6085,7 @@
         <p:spPr>
           <a:xfrm>
             <a:off x="365760" y="731520"/>
-            <a:ext cx="8229600" cy="4476733"/>
+            <a:ext cx="8229600" cy="3589371"/>
           </a:xfrm>
           <a:prstGeom prst="rect">
             <a:avLst/>
@@ -6162,7 +6162,7 @@
         <p:spPr>
           <a:xfrm>
             <a:off x="365760" y="731520"/>
-            <a:ext cx="8229600" cy="4114800"/>
+            <a:ext cx="8229600" cy="3170847"/>
           </a:xfrm>
           <a:prstGeom prst="rect">
             <a:avLst/>
@@ -6239,7 +6239,7 @@
         <p:spPr>
           <a:xfrm>
             <a:off x="365760" y="731520"/>
-            <a:ext cx="8229600" cy="3171259"/>
+            <a:ext cx="8229600" cy="2482460"/>
           </a:xfrm>
           <a:prstGeom prst="rect">
             <a:avLst/>

</xml_diff>

<commit_message>
Fix: Proper Questions were not coming on each slide. Now coming perfectly
</commit_message>
<xml_diff>
--- a/ppts/0625_s04_qp_1_mcq.pptx
+++ b/ppts/0625_s04_qp_1_mcq.pptx
@@ -3236,7 +3236,7 @@
         <p:spPr>
           <a:xfrm>
             <a:off x="365760" y="731520"/>
-            <a:ext cx="8229600" cy="2694311"/>
+            <a:ext cx="8229600" cy="2917026"/>
           </a:xfrm>
           <a:prstGeom prst="rect">
             <a:avLst/>
@@ -3313,7 +3313,7 @@
         <p:spPr>
           <a:xfrm>
             <a:off x="365760" y="731520"/>
-            <a:ext cx="6201084" cy="5943600"/>
+            <a:ext cx="6069612" cy="5943600"/>
           </a:xfrm>
           <a:prstGeom prst="rect">
             <a:avLst/>
@@ -3390,7 +3390,7 @@
         <p:spPr>
           <a:xfrm>
             <a:off x="365760" y="731520"/>
-            <a:ext cx="7918304" cy="5943600"/>
+            <a:ext cx="6224440" cy="5943600"/>
           </a:xfrm>
           <a:prstGeom prst="rect">
             <a:avLst/>
@@ -3467,7 +3467,7 @@
         <p:spPr>
           <a:xfrm>
             <a:off x="365760" y="731520"/>
-            <a:ext cx="8229600" cy="4905167"/>
+            <a:ext cx="8229600" cy="5002944"/>
           </a:xfrm>
           <a:prstGeom prst="rect">
             <a:avLst/>
@@ -3544,7 +3544,7 @@
         <p:spPr>
           <a:xfrm>
             <a:off x="365760" y="731520"/>
-            <a:ext cx="8229600" cy="5040004"/>
+            <a:ext cx="8060871" cy="5943600"/>
           </a:xfrm>
           <a:prstGeom prst="rect">
             <a:avLst/>
@@ -3621,7 +3621,7 @@
         <p:spPr>
           <a:xfrm>
             <a:off x="365760" y="731520"/>
-            <a:ext cx="8229600" cy="4280478"/>
+            <a:ext cx="8229600" cy="4383687"/>
           </a:xfrm>
           <a:prstGeom prst="rect">
             <a:avLst/>
@@ -3698,7 +3698,7 @@
         <p:spPr>
           <a:xfrm>
             <a:off x="365760" y="731520"/>
-            <a:ext cx="8229600" cy="2314065"/>
+            <a:ext cx="7460276" cy="5943600"/>
           </a:xfrm>
           <a:prstGeom prst="rect">
             <a:avLst/>
@@ -3775,7 +3775,7 @@
         <p:spPr>
           <a:xfrm>
             <a:off x="365760" y="731520"/>
-            <a:ext cx="8229600" cy="4791093"/>
+            <a:ext cx="8229600" cy="4888871"/>
           </a:xfrm>
           <a:prstGeom prst="rect">
             <a:avLst/>
@@ -3852,7 +3852,7 @@
         <p:spPr>
           <a:xfrm>
             <a:off x="365760" y="731520"/>
-            <a:ext cx="8229600" cy="3498259"/>
+            <a:ext cx="8083082" cy="5943600"/>
           </a:xfrm>
           <a:prstGeom prst="rect">
             <a:avLst/>
@@ -3929,7 +3929,7 @@
         <p:spPr>
           <a:xfrm>
             <a:off x="365760" y="731520"/>
-            <a:ext cx="8229600" cy="3813319"/>
+            <a:ext cx="8229600" cy="3905664"/>
           </a:xfrm>
           <a:prstGeom prst="rect">
             <a:avLst/>
@@ -4006,7 +4006,7 @@
         <p:spPr>
           <a:xfrm>
             <a:off x="365760" y="731520"/>
-            <a:ext cx="8229600" cy="5188079"/>
+            <a:ext cx="8229600" cy="5437053"/>
           </a:xfrm>
           <a:prstGeom prst="rect">
             <a:avLst/>
@@ -4083,7 +4083,7 @@
         <p:spPr>
           <a:xfrm>
             <a:off x="365760" y="731520"/>
-            <a:ext cx="8229600" cy="5149611"/>
+            <a:ext cx="6953323" cy="5943600"/>
           </a:xfrm>
           <a:prstGeom prst="rect">
             <a:avLst/>
@@ -4160,7 +4160,7 @@
         <p:spPr>
           <a:xfrm>
             <a:off x="365760" y="731520"/>
-            <a:ext cx="8229600" cy="5163558"/>
+            <a:ext cx="8229600" cy="5266714"/>
           </a:xfrm>
           <a:prstGeom prst="rect">
             <a:avLst/>
@@ -4237,7 +4237,7 @@
         <p:spPr>
           <a:xfrm>
             <a:off x="365760" y="731520"/>
-            <a:ext cx="8229600" cy="4372823"/>
+            <a:ext cx="8223336" cy="5943600"/>
           </a:xfrm>
           <a:prstGeom prst="rect">
             <a:avLst/>
@@ -4314,7 +4314,7 @@
         <p:spPr>
           <a:xfrm>
             <a:off x="365760" y="731520"/>
-            <a:ext cx="8229600" cy="2766848"/>
+            <a:ext cx="8229600" cy="2894548"/>
           </a:xfrm>
           <a:prstGeom prst="rect">
             <a:avLst/>
@@ -4391,7 +4391,7 @@
         <p:spPr>
           <a:xfrm>
             <a:off x="365760" y="731520"/>
-            <a:ext cx="7475887" cy="5943600"/>
+            <a:ext cx="4625268" cy="5943600"/>
           </a:xfrm>
           <a:prstGeom prst="rect">
             <a:avLst/>
@@ -4468,7 +4468,7 @@
         <p:spPr>
           <a:xfrm>
             <a:off x="365760" y="731520"/>
-            <a:ext cx="7604311" cy="5943600"/>
+            <a:ext cx="5649233" cy="5943600"/>
           </a:xfrm>
           <a:prstGeom prst="rect">
             <a:avLst/>
@@ -4545,7 +4545,7 @@
         <p:spPr>
           <a:xfrm>
             <a:off x="365760" y="731520"/>
-            <a:ext cx="8229600" cy="2684477"/>
+            <a:ext cx="8229600" cy="5368954"/>
           </a:xfrm>
           <a:prstGeom prst="rect">
             <a:avLst/>
@@ -4622,7 +4622,7 @@
         <p:spPr>
           <a:xfrm>
             <a:off x="365760" y="731520"/>
-            <a:ext cx="8229600" cy="5497264"/>
+            <a:ext cx="8229600" cy="5595041"/>
           </a:xfrm>
           <a:prstGeom prst="rect">
             <a:avLst/>
@@ -4699,7 +4699,7 @@
         <p:spPr>
           <a:xfrm>
             <a:off x="365760" y="731520"/>
-            <a:ext cx="8229600" cy="2522482"/>
+            <a:ext cx="8229600" cy="2664372"/>
           </a:xfrm>
           <a:prstGeom prst="rect">
             <a:avLst/>
@@ -4776,7 +4776,7 @@
         <p:spPr>
           <a:xfrm>
             <a:off x="365760" y="731520"/>
-            <a:ext cx="8229600" cy="2231949"/>
+            <a:ext cx="8229600" cy="3611180"/>
           </a:xfrm>
           <a:prstGeom prst="rect">
             <a:avLst/>
@@ -4853,7 +4853,7 @@
         <p:spPr>
           <a:xfrm>
             <a:off x="365760" y="731520"/>
-            <a:ext cx="8229600" cy="3563443"/>
+            <a:ext cx="7466462" cy="5943600"/>
           </a:xfrm>
           <a:prstGeom prst="rect">
             <a:avLst/>
@@ -4930,7 +4930,7 @@
         <p:spPr>
           <a:xfrm>
             <a:off x="365760" y="731520"/>
-            <a:ext cx="8229600" cy="2205424"/>
+            <a:ext cx="8229600" cy="2324929"/>
           </a:xfrm>
           <a:prstGeom prst="rect">
             <a:avLst/>
@@ -5007,7 +5007,7 @@
         <p:spPr>
           <a:xfrm>
             <a:off x="365760" y="731520"/>
-            <a:ext cx="8229600" cy="2545237"/>
+            <a:ext cx="8229600" cy="2669235"/>
           </a:xfrm>
           <a:prstGeom prst="rect">
             <a:avLst/>
@@ -5084,7 +5084,7 @@
         <p:spPr>
           <a:xfrm>
             <a:off x="365760" y="731520"/>
-            <a:ext cx="8229600" cy="3232087"/>
+            <a:ext cx="7742522" cy="5943600"/>
           </a:xfrm>
           <a:prstGeom prst="rect">
             <a:avLst/>
@@ -5161,7 +5161,7 @@
         <p:spPr>
           <a:xfrm>
             <a:off x="365760" y="731520"/>
-            <a:ext cx="7052284" cy="5943600"/>
+            <a:ext cx="6914902" cy="5943600"/>
           </a:xfrm>
           <a:prstGeom prst="rect">
             <a:avLst/>
@@ -5238,7 +5238,7 @@
         <p:spPr>
           <a:xfrm>
             <a:off x="365760" y="731520"/>
-            <a:ext cx="8229600" cy="3106463"/>
+            <a:ext cx="7995752" cy="5943600"/>
           </a:xfrm>
           <a:prstGeom prst="rect">
             <a:avLst/>
@@ -5315,7 +5315,7 @@
         <p:spPr>
           <a:xfrm>
             <a:off x="365760" y="731520"/>
-            <a:ext cx="8229600" cy="1993544"/>
+            <a:ext cx="8229600" cy="2105681"/>
           </a:xfrm>
           <a:prstGeom prst="rect">
             <a:avLst/>
@@ -5392,7 +5392,7 @@
         <p:spPr>
           <a:xfrm>
             <a:off x="365760" y="731520"/>
-            <a:ext cx="8229600" cy="4706006"/>
+            <a:ext cx="4939397" cy="5943600"/>
           </a:xfrm>
           <a:prstGeom prst="rect">
             <a:avLst/>
@@ -5469,7 +5469,7 @@
         <p:spPr>
           <a:xfrm>
             <a:off x="365760" y="731520"/>
-            <a:ext cx="8229600" cy="5040969"/>
+            <a:ext cx="8229600" cy="5138746"/>
           </a:xfrm>
           <a:prstGeom prst="rect">
             <a:avLst/>
@@ -5546,7 +5546,7 @@
         <p:spPr>
           <a:xfrm>
             <a:off x="365760" y="731520"/>
-            <a:ext cx="8229600" cy="3880306"/>
+            <a:ext cx="8210746" cy="5943600"/>
           </a:xfrm>
           <a:prstGeom prst="rect">
             <a:avLst/>
@@ -5623,7 +5623,7 @@
         <p:spPr>
           <a:xfrm>
             <a:off x="365760" y="731520"/>
-            <a:ext cx="8229600" cy="4422170"/>
+            <a:ext cx="8229600" cy="4620474"/>
           </a:xfrm>
           <a:prstGeom prst="rect">
             <a:avLst/>
@@ -5700,7 +5700,7 @@
         <p:spPr>
           <a:xfrm>
             <a:off x="365760" y="731520"/>
-            <a:ext cx="8229600" cy="4063221"/>
+            <a:ext cx="8229600" cy="4183571"/>
           </a:xfrm>
           <a:prstGeom prst="rect">
             <a:avLst/>
@@ -5777,7 +5777,7 @@
         <p:spPr>
           <a:xfrm>
             <a:off x="365760" y="731520"/>
-            <a:ext cx="8229600" cy="2314065"/>
+            <a:ext cx="8229600" cy="2449867"/>
           </a:xfrm>
           <a:prstGeom prst="rect">
             <a:avLst/>
@@ -5854,7 +5854,7 @@
         <p:spPr>
           <a:xfrm>
             <a:off x="365760" y="731520"/>
-            <a:ext cx="8229600" cy="1038885"/>
+            <a:ext cx="6670040" cy="5943600"/>
           </a:xfrm>
           <a:prstGeom prst="rect">
             <a:avLst/>
@@ -5931,7 +5931,7 @@
         <p:spPr>
           <a:xfrm>
             <a:off x="365760" y="731520"/>
-            <a:ext cx="8229600" cy="2891481"/>
+            <a:ext cx="8229600" cy="3032348"/>
           </a:xfrm>
           <a:prstGeom prst="rect">
             <a:avLst/>
@@ -6008,7 +6008,7 @@
         <p:spPr>
           <a:xfrm>
             <a:off x="365760" y="731520"/>
-            <a:ext cx="8229600" cy="2378926"/>
+            <a:ext cx="7641771" cy="5943600"/>
           </a:xfrm>
           <a:prstGeom prst="rect">
             <a:avLst/>
@@ -6085,7 +6085,7 @@
         <p:spPr>
           <a:xfrm>
             <a:off x="365760" y="731520"/>
-            <a:ext cx="8229600" cy="3589371"/>
+            <a:ext cx="8229600" cy="3194062"/>
           </a:xfrm>
           <a:prstGeom prst="rect">
             <a:avLst/>
@@ -6162,7 +6162,7 @@
         <p:spPr>
           <a:xfrm>
             <a:off x="365760" y="731520"/>
-            <a:ext cx="8229600" cy="3170847"/>
+            <a:ext cx="8229600" cy="3525481"/>
           </a:xfrm>
           <a:prstGeom prst="rect">
             <a:avLst/>
@@ -6239,7 +6239,7 @@
         <p:spPr>
           <a:xfrm>
             <a:off x="365760" y="731520"/>
-            <a:ext cx="8229600" cy="2482460"/>
+            <a:ext cx="8229600" cy="2835545"/>
           </a:xfrm>
           <a:prstGeom prst="rect">
             <a:avLst/>

</xml_diff>